<commit_message>
added changes to documentations and PPP
</commit_message>
<xml_diff>
--- a/docs/diagrams/LogicComponentSequenceDiagram.pptx
+++ b/docs/diagrams/LogicComponentSequenceDiagram.pptx
@@ -212,7 +212,7 @@
           <a:p>
             <a:fld id="{F5CC4B3F-88C1-4FFA-B1B6-F41C21DC6924}" type="datetimeFigureOut">
               <a:rPr lang="en-US" smtClean="0"/>
-              <a:t>3/23/18</a:t>
+              <a:t>4/12/18</a:t>
             </a:fld>
             <a:endParaRPr lang="en-US"/>
           </a:p>
@@ -658,7 +658,7 @@
           <a:p>
             <a:fld id="{78C97017-6FC3-485B-9764-EAC9E56C1D49}" type="datetimeFigureOut">
               <a:rPr lang="en-US" smtClean="0"/>
-              <a:t>3/23/18</a:t>
+              <a:t>4/12/18</a:t>
             </a:fld>
             <a:endParaRPr lang="en-US"/>
           </a:p>
@@ -826,7 +826,7 @@
           <a:p>
             <a:fld id="{78C97017-6FC3-485B-9764-EAC9E56C1D49}" type="datetimeFigureOut">
               <a:rPr lang="en-US" smtClean="0"/>
-              <a:t>3/23/18</a:t>
+              <a:t>4/12/18</a:t>
             </a:fld>
             <a:endParaRPr lang="en-US"/>
           </a:p>
@@ -1004,7 +1004,7 @@
           <a:p>
             <a:fld id="{78C97017-6FC3-485B-9764-EAC9E56C1D49}" type="datetimeFigureOut">
               <a:rPr lang="en-US" smtClean="0"/>
-              <a:t>3/23/18</a:t>
+              <a:t>4/12/18</a:t>
             </a:fld>
             <a:endParaRPr lang="en-US"/>
           </a:p>
@@ -1172,7 +1172,7 @@
           <a:p>
             <a:fld id="{78C97017-6FC3-485B-9764-EAC9E56C1D49}" type="datetimeFigureOut">
               <a:rPr lang="en-US" smtClean="0"/>
-              <a:t>3/23/18</a:t>
+              <a:t>4/12/18</a:t>
             </a:fld>
             <a:endParaRPr lang="en-US"/>
           </a:p>
@@ -1417,7 +1417,7 @@
           <a:p>
             <a:fld id="{78C97017-6FC3-485B-9764-EAC9E56C1D49}" type="datetimeFigureOut">
               <a:rPr lang="en-US" smtClean="0"/>
-              <a:t>3/23/18</a:t>
+              <a:t>4/12/18</a:t>
             </a:fld>
             <a:endParaRPr lang="en-US"/>
           </a:p>
@@ -1702,7 +1702,7 @@
           <a:p>
             <a:fld id="{78C97017-6FC3-485B-9764-EAC9E56C1D49}" type="datetimeFigureOut">
               <a:rPr lang="en-US" smtClean="0"/>
-              <a:t>3/23/18</a:t>
+              <a:t>4/12/18</a:t>
             </a:fld>
             <a:endParaRPr lang="en-US"/>
           </a:p>
@@ -2121,7 +2121,7 @@
           <a:p>
             <a:fld id="{78C97017-6FC3-485B-9764-EAC9E56C1D49}" type="datetimeFigureOut">
               <a:rPr lang="en-US" smtClean="0"/>
-              <a:t>3/23/18</a:t>
+              <a:t>4/12/18</a:t>
             </a:fld>
             <a:endParaRPr lang="en-US"/>
           </a:p>
@@ -2238,7 +2238,7 @@
           <a:p>
             <a:fld id="{78C97017-6FC3-485B-9764-EAC9E56C1D49}" type="datetimeFigureOut">
               <a:rPr lang="en-US" smtClean="0"/>
-              <a:t>3/23/18</a:t>
+              <a:t>4/12/18</a:t>
             </a:fld>
             <a:endParaRPr lang="en-US"/>
           </a:p>
@@ -2333,7 +2333,7 @@
           <a:p>
             <a:fld id="{78C97017-6FC3-485B-9764-EAC9E56C1D49}" type="datetimeFigureOut">
               <a:rPr lang="en-US" smtClean="0"/>
-              <a:t>3/23/18</a:t>
+              <a:t>4/12/18</a:t>
             </a:fld>
             <a:endParaRPr lang="en-US"/>
           </a:p>
@@ -2608,7 +2608,7 @@
           <a:p>
             <a:fld id="{78C97017-6FC3-485B-9764-EAC9E56C1D49}" type="datetimeFigureOut">
               <a:rPr lang="en-US" smtClean="0"/>
-              <a:t>3/23/18</a:t>
+              <a:t>4/12/18</a:t>
             </a:fld>
             <a:endParaRPr lang="en-US"/>
           </a:p>
@@ -2860,7 +2860,7 @@
           <a:p>
             <a:fld id="{78C97017-6FC3-485B-9764-EAC9E56C1D49}" type="datetimeFigureOut">
               <a:rPr lang="en-US" smtClean="0"/>
-              <a:t>3/23/18</a:t>
+              <a:t>4/12/18</a:t>
             </a:fld>
             <a:endParaRPr lang="en-US"/>
           </a:p>
@@ -3071,7 +3071,7 @@
           <a:p>
             <a:fld id="{78C97017-6FC3-485B-9764-EAC9E56C1D49}" type="datetimeFigureOut">
               <a:rPr lang="en-US" smtClean="0"/>
-              <a:t>3/23/18</a:t>
+              <a:t>4/12/18</a:t>
             </a:fld>
             <a:endParaRPr lang="en-US"/>
           </a:p>
@@ -3556,15 +3556,7 @@
                   <a:schemeClr val="bg1"/>
                 </a:solidFill>
               </a:rPr>
-              <a:t>:</a:t>
-            </a:r>
-            <a:r>
-              <a:rPr lang="en-US" sz="1600" dirty="0" err="1">
-                <a:solidFill>
-                  <a:schemeClr val="bg1"/>
-                </a:solidFill>
-              </a:rPr>
-              <a:t>LogicManager</a:t>
+              <a:t>:LogicManager</a:t>
             </a:r>
             <a:endParaRPr lang="en-SG" sz="1600" dirty="0">
               <a:solidFill>
@@ -3702,18 +3694,23 @@
           <a:p>
             <a:pPr algn="ctr"/>
             <a:r>
-              <a:rPr lang="en-US" sz="1600" dirty="0">
+              <a:rPr lang="en-US" sz="1600" dirty="0" smtClean="0">
                 <a:solidFill>
                   <a:schemeClr val="bg1"/>
                 </a:solidFill>
               </a:rPr>
-              <a:t>:Address</a:t>
-            </a:r>
+              <a:t>:Internship</a:t>
+            </a:r>
+            <a:endParaRPr lang="en-US" sz="1600" dirty="0">
+              <a:solidFill>
+                <a:schemeClr val="bg1"/>
+              </a:solidFill>
+            </a:endParaRPr>
           </a:p>
           <a:p>
             <a:pPr algn="ctr"/>
             <a:r>
-              <a:rPr lang="en-US" sz="1600" dirty="0" err="1">
+              <a:rPr lang="en-US" sz="1600" dirty="0">
                 <a:solidFill>
                   <a:schemeClr val="bg1"/>
                 </a:solidFill>
@@ -3860,20 +3857,12 @@
           <a:p>
             <a:pPr algn="ctr"/>
             <a:r>
-              <a:rPr lang="en-US" sz="1600" dirty="0" err="1" smtClean="0">
+              <a:rPr lang="en-US" sz="1600" dirty="0" smtClean="0">
                 <a:solidFill>
                   <a:schemeClr val="bg1"/>
                 </a:solidFill>
               </a:rPr>
-              <a:t>s</a:t>
-            </a:r>
-            <a:r>
-              <a:rPr lang="en-US" sz="1600" dirty="0" err="1" smtClean="0">
-                <a:solidFill>
-                  <a:schemeClr val="bg1"/>
-                </a:solidFill>
-              </a:rPr>
-              <a:t>:Save</a:t>
+              <a:t>s:Save</a:t>
             </a:r>
             <a:r>
               <a:rPr lang="en-US" sz="1600" dirty="0">
@@ -4101,23 +4090,7 @@
                   <a:srgbClr val="0070C0"/>
                 </a:solidFill>
               </a:rPr>
-              <a:t>(“</a:t>
-            </a:r>
-            <a:r>
-              <a:rPr lang="en-US" sz="1400" dirty="0" smtClean="0">
-                <a:solidFill>
-                  <a:srgbClr val="0070C0"/>
-                </a:solidFill>
-              </a:rPr>
-              <a:t>save</a:t>
-            </a:r>
-            <a:r>
-              <a:rPr lang="en-US" sz="1400" dirty="0" smtClean="0">
-                <a:solidFill>
-                  <a:srgbClr val="0070C0"/>
-                </a:solidFill>
-              </a:rPr>
-              <a:t> </a:t>
+              <a:t>(“save </a:t>
             </a:r>
             <a:r>
               <a:rPr lang="en-US" sz="1400" dirty="0">
@@ -4714,28 +4687,12 @@
           </a:lstStyle>
           <a:p>
             <a:r>
-              <a:rPr lang="en-US" dirty="0" err="1" smtClean="0">
-                <a:solidFill>
-                  <a:srgbClr val="7030A0"/>
-                </a:solidFill>
-              </a:rPr>
-              <a:t>update</a:t>
-            </a:r>
-            <a:r>
-              <a:rPr lang="en-US" dirty="0" err="1" smtClean="0">
-                <a:solidFill>
-                  <a:srgbClr val="7030A0"/>
-                </a:solidFill>
-              </a:rPr>
-              <a:t>Person</a:t>
-            </a:r>
-            <a:r>
               <a:rPr lang="en-US" dirty="0" smtClean="0">
                 <a:solidFill>
                   <a:srgbClr val="7030A0"/>
                 </a:solidFill>
               </a:rPr>
-              <a:t>(p)</a:t>
+              <a:t>updatePerson(p)</a:t>
             </a:r>
             <a:endParaRPr lang="en-US" dirty="0">
               <a:solidFill>
@@ -4824,15 +4781,7 @@
             </a:r>
             <a:r>
               <a:rPr lang="en-US" dirty="0" smtClean="0"/>
-              <a:t>(“</a:t>
-            </a:r>
-            <a:r>
-              <a:rPr lang="en-US" dirty="0" smtClean="0"/>
-              <a:t>save</a:t>
-            </a:r>
-            <a:r>
-              <a:rPr lang="en-US" dirty="0" smtClean="0"/>
-              <a:t> </a:t>
+              <a:t>(“save </a:t>
             </a:r>
             <a:r>
               <a:rPr lang="en-US" dirty="0"/>
@@ -4965,20 +4914,12 @@
           <a:p>
             <a:pPr algn="ctr"/>
             <a:r>
-              <a:rPr lang="en-US" sz="1600" dirty="0" err="1">
-                <a:solidFill>
-                  <a:schemeClr val="bg1"/>
-                </a:solidFill>
-              </a:rPr>
-              <a:t>result:Command</a:t>
-            </a:r>
-            <a:r>
               <a:rPr lang="en-US" sz="1600" dirty="0">
                 <a:solidFill>
                   <a:schemeClr val="bg1"/>
                 </a:solidFill>
               </a:rPr>
-              <a:t> Result</a:t>
+              <a:t>result:Command Result</a:t>
             </a:r>
             <a:endParaRPr lang="en-SG" sz="1600" dirty="0">
               <a:solidFill>
@@ -5110,7 +5051,6 @@
               <a:rPr lang="en-US" dirty="0"/>
               <a:t>s</a:t>
             </a:r>
-            <a:endParaRPr lang="en-US" dirty="0"/>
           </a:p>
         </p:txBody>
       </p:sp>
@@ -5163,23 +5103,7 @@
                   <a:schemeClr val="bg1"/>
                 </a:solidFill>
               </a:rPr>
-              <a:t>:</a:t>
-            </a:r>
-            <a:r>
-              <a:rPr lang="en-US" sz="1600" dirty="0" err="1" smtClean="0">
-                <a:solidFill>
-                  <a:schemeClr val="bg1"/>
-                </a:solidFill>
-              </a:rPr>
-              <a:t>Save</a:t>
-            </a:r>
-            <a:r>
-              <a:rPr lang="en-US" sz="1600" dirty="0" err="1" smtClean="0">
-                <a:solidFill>
-                  <a:schemeClr val="bg1"/>
-                </a:solidFill>
-              </a:rPr>
-              <a:t>Command</a:t>
+              <a:t>:SaveCommand</a:t>
             </a:r>
             <a:endParaRPr lang="en-US" sz="1600" dirty="0">
               <a:solidFill>
@@ -5703,12 +5627,8 @@
           </a:lstStyle>
           <a:p>
             <a:r>
-              <a:rPr lang="en-US" dirty="0" err="1" smtClean="0"/>
-              <a:t>addSavedTagToInternship</a:t>
-            </a:r>
-            <a:r>
               <a:rPr lang="en-US" dirty="0" smtClean="0"/>
-              <a:t>()</a:t>
+              <a:t>addSavedTagToInternship()</a:t>
             </a:r>
             <a:endParaRPr lang="en-US" dirty="0"/>
           </a:p>

</xml_diff>